<commit_message>
modify some grammar error
</commit_message>
<xml_diff>
--- a/final-presentation.pptx
+++ b/final-presentation.pptx
@@ -5398,7 +5398,7 @@
             </a:r>
             <a:r>
               <a:rPr lang="en-US" altLang="zh-CN" dirty="0"/>
-              <a:t>.</a:t>
+              <a:t>. </a:t>
             </a:r>
             <a:endParaRPr lang="en-US" dirty="0"/>
           </a:p>
@@ -6914,7 +6914,7 @@
                 <a:latin typeface="Microsoft YaHei" panose="020B0503020204020204" pitchFamily="34" charset="-122"/>
                 <a:ea typeface="Microsoft YaHei" panose="020B0503020204020204" pitchFamily="34" charset="-122"/>
               </a:rPr>
-              <a:t>Training data set consists of 10000 14-dimential observations with labels, 10-fold cross validation will be implemented on it. Beside, a testing data set with 4980 observations provide on Kaggle </a:t>
+              <a:t>Training data set consists of 10000 14-dimential observations with labels, 10-fold cross validation will be implemented on it. Beside, a testing data set with 4980 observations is provided on Kaggle </a:t>
             </a:r>
             <a:endParaRPr lang="zh-CN" altLang="en-US" sz="2000" dirty="0">
               <a:latin typeface="Microsoft YaHei" panose="020B0503020204020204" pitchFamily="34" charset="-122"/>
@@ -10644,7 +10644,7 @@
         </p:nvSpPr>
         <p:spPr>
           <a:xfrm>
-            <a:off x="6574251" y="5902776"/>
+            <a:off x="6661060" y="5697140"/>
             <a:ext cx="5482591" cy="369332"/>
           </a:xfrm>
           <a:prstGeom prst="rect">

</xml_diff>

<commit_message>
updated svm figure and grammar
</commit_message>
<xml_diff>
--- a/final-presentation.pptx
+++ b/final-presentation.pptx
@@ -5300,7 +5300,7 @@
             </a:r>
             <a:r>
               <a:rPr lang="en-US" dirty="0"/>
-              <a:t>onclusion</a:t>
+              <a:t>onclusions</a:t>
             </a:r>
           </a:p>
         </p:txBody>
@@ -5419,7 +5419,7 @@
             </a:r>
             <a:r>
               <a:rPr lang="en-US" dirty="0"/>
-              <a:t>SVM performs best among all the models</a:t>
+              <a:t>SVM performs the best among all the models</a:t>
             </a:r>
             <a:r>
               <a:rPr lang="en-US" altLang="zh-CN" dirty="0"/>
@@ -5431,27 +5431,7 @@
             </a:r>
             <a:r>
               <a:rPr lang="en-US" altLang="zh-CN" dirty="0"/>
-              <a:t>as</a:t>
-            </a:r>
-            <a:r>
-              <a:rPr lang="zh-CN" altLang="en-US" dirty="0"/>
-              <a:t> </a:t>
-            </a:r>
-            <a:r>
-              <a:rPr lang="en-US" altLang="zh-CN" dirty="0"/>
-              <a:t>well</a:t>
-            </a:r>
-            <a:r>
-              <a:rPr lang="zh-CN" altLang="en-US" dirty="0"/>
-              <a:t> </a:t>
-            </a:r>
-            <a:r>
-              <a:rPr lang="en-US" altLang="zh-CN" dirty="0"/>
-              <a:t>as</a:t>
-            </a:r>
-            <a:r>
-              <a:rPr lang="zh-CN" altLang="en-US" dirty="0"/>
-              <a:t> </a:t>
+              <a:t>and </a:t>
             </a:r>
             <a:r>
               <a:rPr lang="en-US" altLang="zh-CN" dirty="0" err="1"/>
@@ -5471,15 +5451,7 @@
             </a:r>
             <a:r>
               <a:rPr lang="en-US" altLang="zh-CN" dirty="0"/>
-              <a:t>another</a:t>
-            </a:r>
-            <a:r>
-              <a:rPr lang="zh-CN" altLang="en-US" dirty="0"/>
-              <a:t> </a:t>
-            </a:r>
-            <a:r>
-              <a:rPr lang="en-US" altLang="zh-CN" dirty="0"/>
-              <a:t>good</a:t>
+              <a:t>a good</a:t>
             </a:r>
             <a:r>
               <a:rPr lang="zh-CN" altLang="en-US" dirty="0"/>
@@ -5494,8 +5466,8 @@
               <a:t> </a:t>
             </a:r>
             <a:r>
-              <a:rPr lang="en-US" altLang="zh-CN" dirty="0"/>
-              <a:t>classifier.</a:t>
+              <a:rPr lang="en-US" altLang="zh-CN"/>
+              <a:t>classifier as well.</a:t>
             </a:r>
             <a:endParaRPr lang="en-US" dirty="0"/>
           </a:p>
@@ -6386,11 +6358,11 @@
             </a:r>
             <a:r>
               <a:rPr lang="en-US" altLang="zh-CN" sz="2000" dirty="0"/>
-              <a:t>recognition</a:t>
-            </a:r>
-            <a:r>
-              <a:rPr lang="zh-CN" altLang="en-US" sz="2000" dirty="0"/>
-              <a:t>，</a:t>
+              <a:t>recognition,</a:t>
+            </a:r>
+            <a:r>
+              <a:rPr lang="zh-CN" altLang="en-US" sz="2000" dirty="0"/>
+              <a:t> </a:t>
             </a:r>
             <a:r>
               <a:rPr lang="en-US" altLang="zh-CN" sz="2000" dirty="0"/>
@@ -6450,15 +6422,7 @@
             </a:r>
             <a:r>
               <a:rPr lang="en-US" altLang="zh-CN" sz="2000" dirty="0"/>
-              <a:t>scale,</a:t>
-            </a:r>
-            <a:r>
-              <a:rPr lang="zh-CN" altLang="en-US" sz="2000" dirty="0"/>
-              <a:t> </a:t>
-            </a:r>
-            <a:r>
-              <a:rPr lang="en-US" altLang="zh-CN" sz="2000" dirty="0"/>
-              <a:t>glasses,</a:t>
+              <a:t>scale and glasses,</a:t>
             </a:r>
             <a:r>
               <a:rPr lang="zh-CN" altLang="en-US" sz="2000" dirty="0"/>
@@ -6946,7 +6910,7 @@
                 <a:latin typeface="Microsoft YaHei" panose="020B0503020204020204" pitchFamily="34" charset="-122"/>
                 <a:ea typeface="Microsoft YaHei" panose="020B0503020204020204" pitchFamily="34" charset="-122"/>
               </a:rPr>
-              <a:t>The objective of our project is to train an optimal model for eye blinking prediction based on 14-dimensional EEG signal. There are only 2 states of eye blinking which are open and closed, so basically we should construct a binary classifier to predict eye blinking.</a:t>
+              <a:t>The objective of our project is to train an optimal model for eye blinking prediction based on 14-dimensional EEG signals. There are only 2 states of eye blinking which are open and closed, so basically we should construct a binary classifier to predict eye blinking.</a:t>
             </a:r>
             <a:endParaRPr lang="zh-CN" altLang="en-US" sz="2000" dirty="0">
               <a:latin typeface="Microsoft YaHei" panose="020B0503020204020204" pitchFamily="34" charset="-122"/>
@@ -8131,8 +8095,8 @@
         </p:nvSpPr>
         <p:spPr>
           <a:xfrm>
-            <a:off x="4092388" y="2479342"/>
-            <a:ext cx="2980706" cy="369332"/>
+            <a:off x="3051064" y="2479342"/>
+            <a:ext cx="4022030" cy="369332"/>
           </a:xfrm>
           <a:prstGeom prst="rect">
             <a:avLst/>
@@ -8147,7 +8111,7 @@
           <a:p>
             <a:r>
               <a:rPr lang="en-US" dirty="0"/>
-              <a:t>14 dim original measurement</a:t>
+              <a:t>14-dimentional original measurement</a:t>
             </a:r>
           </a:p>
         </p:txBody>
@@ -9606,7 +9570,7 @@
             </a:r>
             <a:r>
               <a:rPr lang="en-US" altLang="zh-CN" sz="2000" dirty="0"/>
-              <a:t>generates</a:t>
+              <a:t>has generated</a:t>
             </a:r>
             <a:r>
               <a:rPr lang="zh-CN" altLang="en-US" sz="2000" dirty="0"/>
@@ -10135,7 +10099,7 @@
           <a:p>
             <a:r>
               <a:rPr lang="en-US" altLang="zh-CN" sz="2000" dirty="0"/>
-              <a:t>Using</a:t>
+              <a:t>We use</a:t>
             </a:r>
             <a:r>
               <a:rPr lang="zh-CN" altLang="en-US" sz="2000" dirty="0"/>
@@ -10191,7 +10155,7 @@
             </a:r>
             <a:r>
               <a:rPr lang="en-US" altLang="zh-CN" sz="2000" dirty="0"/>
-              <a:t>average</a:t>
+              <a:t>and average</a:t>
             </a:r>
             <a:r>
               <a:rPr lang="zh-CN" altLang="en-US" sz="2000" dirty="0"/>
@@ -10250,7 +10214,7 @@
             </a:r>
             <a:r>
               <a:rPr lang="en-US" sz="2000" dirty="0"/>
-              <a:t> if integrated with feature selective algorithm, which gives a smaller average error.</a:t>
+              <a:t> if integrated with feature-selective algorithm, which gives a smaller average error.</a:t>
             </a:r>
           </a:p>
           <a:p>
@@ -10280,6 +10244,22 @@
             </a:r>
             <a:r>
               <a:rPr lang="en-US" altLang="zh-CN" sz="2000" dirty="0"/>
+              <a:t>number</a:t>
+            </a:r>
+            <a:r>
+              <a:rPr lang="zh-CN" altLang="en-US" sz="2000" dirty="0"/>
+              <a:t> </a:t>
+            </a:r>
+            <a:r>
+              <a:rPr lang="en-US" altLang="zh-CN" sz="2000" dirty="0"/>
+              <a:t>of</a:t>
+            </a:r>
+            <a:r>
+              <a:rPr lang="zh-CN" altLang="en-US" sz="2000" dirty="0"/>
+              <a:t> </a:t>
+            </a:r>
+            <a:r>
+              <a:rPr lang="en-US" altLang="zh-CN" sz="2000" dirty="0"/>
               <a:t>nodes</a:t>
             </a:r>
             <a:r>
@@ -10296,7 +10276,7 @@
             </a:r>
             <a:r>
               <a:rPr lang="en-US" altLang="zh-CN" sz="2000" dirty="0"/>
-              <a:t>bigger,</a:t>
+              <a:t>larger,</a:t>
             </a:r>
             <a:r>
               <a:rPr lang="zh-CN" altLang="en-US" sz="2000" dirty="0"/>
@@ -10384,7 +10364,7 @@
             </a:r>
             <a:r>
               <a:rPr lang="en-US" altLang="zh-CN" sz="2000" dirty="0"/>
-              <a:t>means</a:t>
+              <a:t>indicates</a:t>
             </a:r>
             <a:r>
               <a:rPr lang="zh-CN" altLang="en-US" sz="2000" dirty="0"/>
@@ -10877,13 +10857,13 @@
                   <a:srgbClr val="FF0000"/>
                 </a:solidFill>
               </a:rPr>
-              <a:t>3.5%.</a:t>
-            </a:r>
-            <a:endParaRPr lang="zh-CN" altLang="en-US" sz="2000" dirty="0">
-              <a:solidFill>
-                <a:srgbClr val="FF0000"/>
-              </a:solidFill>
-            </a:endParaRPr>
+              <a:t>3.5%</a:t>
+            </a:r>
+            <a:r>
+              <a:rPr lang="en-US" altLang="zh-CN" sz="2000" dirty="0"/>
+              <a:t>.</a:t>
+            </a:r>
+            <a:endParaRPr lang="zh-CN" altLang="en-US" sz="2000" dirty="0"/>
           </a:p>
         </p:txBody>
       </p:sp>
@@ -11023,19 +11003,35 @@
               <a:t> algorithm with </a:t>
             </a:r>
             <a:r>
-              <a:rPr lang="en-US" altLang="zh-CN" sz="2000" dirty="0"/>
+              <a:rPr lang="en-US" altLang="zh-CN" sz="2000" dirty="0">
+                <a:solidFill>
+                  <a:srgbClr val="FF0000"/>
+                </a:solidFill>
+              </a:rPr>
               <a:t>at</a:t>
             </a:r>
             <a:r>
-              <a:rPr lang="zh-CN" altLang="en-US" sz="2000" dirty="0"/>
-              <a:t> </a:t>
-            </a:r>
-            <a:r>
-              <a:rPr lang="en-US" altLang="zh-CN" sz="2000" dirty="0"/>
+              <a:rPr lang="zh-CN" altLang="en-US" sz="2000" dirty="0">
+                <a:solidFill>
+                  <a:srgbClr val="FF0000"/>
+                </a:solidFill>
+              </a:rPr>
+              <a:t> </a:t>
+            </a:r>
+            <a:r>
+              <a:rPr lang="en-US" altLang="zh-CN" sz="2000" dirty="0">
+                <a:solidFill>
+                  <a:srgbClr val="FF0000"/>
+                </a:solidFill>
+              </a:rPr>
               <a:t>most</a:t>
             </a:r>
             <a:r>
-              <a:rPr lang="zh-CN" altLang="en-US" sz="2000" dirty="0"/>
+              <a:rPr lang="zh-CN" altLang="en-US" sz="2000" dirty="0">
+                <a:solidFill>
+                  <a:srgbClr val="FF0000"/>
+                </a:solidFill>
+              </a:rPr>
               <a:t> </a:t>
             </a:r>
             <a:r>
@@ -11044,11 +11040,11 @@
                   <a:srgbClr val="FF0000"/>
                 </a:solidFill>
               </a:rPr>
-              <a:t>500 split </a:t>
+              <a:t>500 splits </a:t>
             </a:r>
             <a:r>
               <a:rPr lang="en-US" sz="2000" dirty="0"/>
-              <a:t>nodes for tree</a:t>
+              <a:t>for the tree</a:t>
             </a:r>
             <a:r>
               <a:rPr lang="zh-CN" altLang="en-US" sz="2000" dirty="0"/>
@@ -11104,7 +11100,7 @@
             </a:r>
             <a:r>
               <a:rPr lang="en-US" altLang="zh-CN" sz="2000" dirty="0"/>
-              <a:t>level</a:t>
+              <a:t>level number</a:t>
             </a:r>
             <a:r>
               <a:rPr lang="zh-CN" altLang="en-US" sz="2000" dirty="0"/>
@@ -11475,7 +11471,7 @@
                   <a:srgbClr val="FF0000"/>
                 </a:solidFill>
               </a:rPr>
-              <a:t>2.716%.</a:t>
+              <a:t>2.5398%.</a:t>
             </a:r>
           </a:p>
           <a:p>
@@ -11551,12 +11547,199 @@
           </a:p>
         </p:txBody>
       </p:sp>
+      <p:sp>
+        <p:nvSpPr>
+          <p:cNvPr id="10" name="TextBox 9">
+            <a:extLst>
+              <a:ext uri="{FF2B5EF4-FFF2-40B4-BE49-F238E27FC236}">
+                <a16:creationId xmlns:a16="http://schemas.microsoft.com/office/drawing/2014/main" id="{FB659BA1-29B6-6244-85A3-57265E689DF4}"/>
+              </a:ext>
+            </a:extLst>
+          </p:cNvPr>
+          <p:cNvSpPr txBox="1"/>
+          <p:nvPr/>
+        </p:nvSpPr>
+        <p:spPr>
+          <a:xfrm>
+            <a:off x="201881" y="5625539"/>
+            <a:ext cx="3716976" cy="371500"/>
+          </a:xfrm>
+          <a:prstGeom prst="rect">
+            <a:avLst/>
+          </a:prstGeom>
+          <a:noFill/>
+        </p:spPr>
+        <p:txBody>
+          <a:bodyPr wrap="square" rtlCol="0">
+            <a:spAutoFit/>
+          </a:bodyPr>
+          <a:lstStyle/>
+          <a:p>
+            <a:r>
+              <a:rPr lang="en-US" altLang="zh-CN" dirty="0"/>
+              <a:t>figure</a:t>
+            </a:r>
+            <a:r>
+              <a:rPr lang="zh-CN" altLang="en-US" dirty="0"/>
+              <a:t> </a:t>
+            </a:r>
+            <a:r>
+              <a:rPr lang="en-US" altLang="zh-CN" dirty="0"/>
+              <a:t>A:</a:t>
+            </a:r>
+            <a:r>
+              <a:rPr lang="zh-CN" altLang="en-US" dirty="0"/>
+              <a:t> </a:t>
+            </a:r>
+            <a:r>
+              <a:rPr lang="en-US" altLang="zh-CN" dirty="0"/>
+              <a:t>min</a:t>
+            </a:r>
+            <a:r>
+              <a:rPr lang="zh-CN" altLang="en-US" dirty="0"/>
+              <a:t> </a:t>
+            </a:r>
+            <a:r>
+              <a:rPr lang="en-US" altLang="zh-CN" dirty="0"/>
+              <a:t>objective</a:t>
+            </a:r>
+            <a:r>
+              <a:rPr lang="zh-CN" altLang="en-US" dirty="0"/>
+              <a:t> </a:t>
+            </a:r>
+            <a:r>
+              <a:rPr lang="en-US" altLang="zh-CN" dirty="0"/>
+              <a:t>optimization</a:t>
+            </a:r>
+            <a:endParaRPr lang="en-US" dirty="0"/>
+          </a:p>
+        </p:txBody>
+      </p:sp>
+      <p:sp>
+        <p:nvSpPr>
+          <p:cNvPr id="11" name="TextBox 10">
+            <a:extLst>
+              <a:ext uri="{FF2B5EF4-FFF2-40B4-BE49-F238E27FC236}">
+                <a16:creationId xmlns:a16="http://schemas.microsoft.com/office/drawing/2014/main" id="{09DC4EE9-EE1D-C54C-9175-B63E29C9EF6E}"/>
+              </a:ext>
+            </a:extLst>
+          </p:cNvPr>
+          <p:cNvSpPr txBox="1"/>
+          <p:nvPr/>
+        </p:nvSpPr>
+        <p:spPr>
+          <a:xfrm>
+            <a:off x="4582652" y="5625539"/>
+            <a:ext cx="4007369" cy="369332"/>
+          </a:xfrm>
+          <a:prstGeom prst="rect">
+            <a:avLst/>
+          </a:prstGeom>
+          <a:noFill/>
+        </p:spPr>
+        <p:txBody>
+          <a:bodyPr wrap="square" rtlCol="0">
+            <a:spAutoFit/>
+          </a:bodyPr>
+          <a:lstStyle/>
+          <a:p>
+            <a:r>
+              <a:rPr lang="en-US" altLang="zh-CN" dirty="0"/>
+              <a:t>figure</a:t>
+            </a:r>
+            <a:r>
+              <a:rPr lang="zh-CN" altLang="en-US" dirty="0"/>
+              <a:t> </a:t>
+            </a:r>
+            <a:r>
+              <a:rPr lang="en-US" altLang="zh-CN" dirty="0"/>
+              <a:t>B:</a:t>
+            </a:r>
+            <a:r>
+              <a:rPr lang="zh-CN" altLang="en-US" dirty="0"/>
+              <a:t> </a:t>
+            </a:r>
+            <a:r>
+              <a:rPr lang="en-US" altLang="zh-CN" dirty="0"/>
+              <a:t>hyperparameter</a:t>
+            </a:r>
+            <a:r>
+              <a:rPr lang="zh-CN" altLang="en-US" dirty="0"/>
+              <a:t> </a:t>
+            </a:r>
+            <a:r>
+              <a:rPr lang="en-US" altLang="zh-CN" dirty="0"/>
+              <a:t>optimization</a:t>
+            </a:r>
+            <a:endParaRPr lang="en-US" dirty="0"/>
+          </a:p>
+        </p:txBody>
+      </p:sp>
+      <p:sp>
+        <p:nvSpPr>
+          <p:cNvPr id="12" name="TextBox 11">
+            <a:extLst>
+              <a:ext uri="{FF2B5EF4-FFF2-40B4-BE49-F238E27FC236}">
+                <a16:creationId xmlns:a16="http://schemas.microsoft.com/office/drawing/2014/main" id="{71C9AD45-790D-D648-AB62-EFD3DDE851F1}"/>
+              </a:ext>
+            </a:extLst>
+          </p:cNvPr>
+          <p:cNvSpPr txBox="1"/>
+          <p:nvPr/>
+        </p:nvSpPr>
+        <p:spPr>
+          <a:xfrm>
+            <a:off x="8610600" y="4523229"/>
+            <a:ext cx="3716976" cy="371500"/>
+          </a:xfrm>
+          <a:prstGeom prst="rect">
+            <a:avLst/>
+          </a:prstGeom>
+          <a:noFill/>
+        </p:spPr>
+        <p:txBody>
+          <a:bodyPr wrap="square" rtlCol="0">
+            <a:spAutoFit/>
+          </a:bodyPr>
+          <a:lstStyle/>
+          <a:p>
+            <a:r>
+              <a:rPr lang="en-US" altLang="zh-CN" dirty="0"/>
+              <a:t>figure</a:t>
+            </a:r>
+            <a:r>
+              <a:rPr lang="zh-CN" altLang="en-US" dirty="0"/>
+              <a:t> </a:t>
+            </a:r>
+            <a:r>
+              <a:rPr lang="en-US" altLang="zh-CN" dirty="0"/>
+              <a:t>C:</a:t>
+            </a:r>
+            <a:r>
+              <a:rPr lang="zh-CN" altLang="en-US" dirty="0"/>
+              <a:t> </a:t>
+            </a:r>
+            <a:r>
+              <a:rPr lang="en-US" altLang="zh-CN" dirty="0"/>
+              <a:t>best</a:t>
+            </a:r>
+            <a:r>
+              <a:rPr lang="zh-CN" altLang="en-US" dirty="0"/>
+              <a:t> </a:t>
+            </a:r>
+            <a:r>
+              <a:rPr lang="en-US" dirty="0"/>
+              <a:t>hyperparameter</a:t>
+            </a:r>
+          </a:p>
+        </p:txBody>
+      </p:sp>
       <p:pic>
         <p:nvPicPr>
-          <p:cNvPr id="7" name="Picture 6" descr="A close up of a map&#10;&#10;Description automatically generated">
-            <a:extLst>
-              <a:ext uri="{FF2B5EF4-FFF2-40B4-BE49-F238E27FC236}">
-                <a16:creationId xmlns:a16="http://schemas.microsoft.com/office/drawing/2014/main" id="{032E8BE9-9164-9C4D-A02F-BBDD28AFDB79}"/>
+          <p:cNvPr id="13" name="Picture 12" descr="A picture containing text&#10;&#10;Description automatically generated">
+            <a:extLst>
+              <a:ext uri="{FF2B5EF4-FFF2-40B4-BE49-F238E27FC236}">
+                <a16:creationId xmlns:a16="http://schemas.microsoft.com/office/drawing/2014/main" id="{B2D74B75-7ECB-5F4D-9073-D35466EC67E2}"/>
               </a:ext>
             </a:extLst>
           </p:cNvPr>
@@ -11573,8 +11756,8 @@
         </p:blipFill>
         <p:spPr>
           <a:xfrm>
-            <a:off x="4428650" y="2540676"/>
-            <a:ext cx="4024982" cy="3084863"/>
+            <a:off x="4458465" y="2328633"/>
+            <a:ext cx="4007369" cy="3360043"/>
           </a:xfrm>
           <a:prstGeom prst="rect">
             <a:avLst/>
@@ -11583,10 +11766,10 @@
       </p:pic>
       <p:pic>
         <p:nvPicPr>
-          <p:cNvPr id="9" name="Picture 8" descr="A screenshot of a cell phone&#10;&#10;Description automatically generated">
-            <a:extLst>
-              <a:ext uri="{FF2B5EF4-FFF2-40B4-BE49-F238E27FC236}">
-                <a16:creationId xmlns:a16="http://schemas.microsoft.com/office/drawing/2014/main" id="{25C6AA6C-891C-F743-A287-AA7F68401531}"/>
+          <p:cNvPr id="15" name="Picture 14" descr="A screenshot of a cell phone&#10;&#10;Description automatically generated">
+            <a:extLst>
+              <a:ext uri="{FF2B5EF4-FFF2-40B4-BE49-F238E27FC236}">
+                <a16:creationId xmlns:a16="http://schemas.microsoft.com/office/drawing/2014/main" id="{FA3A04CF-ECE0-AF47-9AE6-5070FDEA79AA}"/>
               </a:ext>
             </a:extLst>
           </p:cNvPr>
@@ -11595,15 +11778,16 @@
           </p:cNvPicPr>
           <p:nvPr/>
         </p:nvPicPr>
-        <p:blipFill rotWithShape="1">
+        <p:blipFill>
           <a:blip r:embed="rId3"/>
-          <a:srcRect r="14293"/>
-          <a:stretch/>
+          <a:stretch>
+            <a:fillRect/>
+          </a:stretch>
         </p:blipFill>
         <p:spPr>
           <a:xfrm>
-            <a:off x="8610600" y="3048759"/>
-            <a:ext cx="3419593" cy="1325563"/>
+            <a:off x="139176" y="2318183"/>
+            <a:ext cx="4246906" cy="3370493"/>
           </a:xfrm>
           <a:prstGeom prst="rect">
             <a:avLst/>
@@ -11612,10 +11796,10 @@
       </p:pic>
       <p:pic>
         <p:nvPicPr>
-          <p:cNvPr id="8" name="Picture 7" descr="A screenshot of a map&#10;&#10;Description automatically generated">
-            <a:extLst>
-              <a:ext uri="{FF2B5EF4-FFF2-40B4-BE49-F238E27FC236}">
-                <a16:creationId xmlns:a16="http://schemas.microsoft.com/office/drawing/2014/main" id="{2AC6E7ED-4758-0A44-8332-5928C1C56650}"/>
+          <p:cNvPr id="17" name="Picture 16" descr="A screenshot of a cell phone&#10;&#10;Description automatically generated">
+            <a:extLst>
+              <a:ext uri="{FF2B5EF4-FFF2-40B4-BE49-F238E27FC236}">
+                <a16:creationId xmlns:a16="http://schemas.microsoft.com/office/drawing/2014/main" id="{F8CFB628-4910-4840-B37B-0C315A9A9BB6}"/>
               </a:ext>
             </a:extLst>
           </p:cNvPr>
@@ -11632,201 +11816,14 @@
         </p:blipFill>
         <p:spPr>
           <a:xfrm>
-            <a:off x="95002" y="2540676"/>
-            <a:ext cx="4007370" cy="3084863"/>
+            <a:off x="8538217" y="3015159"/>
+            <a:ext cx="3568090" cy="1358900"/>
           </a:xfrm>
           <a:prstGeom prst="rect">
             <a:avLst/>
           </a:prstGeom>
         </p:spPr>
       </p:pic>
-      <p:sp>
-        <p:nvSpPr>
-          <p:cNvPr id="10" name="TextBox 9">
-            <a:extLst>
-              <a:ext uri="{FF2B5EF4-FFF2-40B4-BE49-F238E27FC236}">
-                <a16:creationId xmlns:a16="http://schemas.microsoft.com/office/drawing/2014/main" id="{FB659BA1-29B6-6244-85A3-57265E689DF4}"/>
-              </a:ext>
-            </a:extLst>
-          </p:cNvPr>
-          <p:cNvSpPr txBox="1"/>
-          <p:nvPr/>
-        </p:nvSpPr>
-        <p:spPr>
-          <a:xfrm>
-            <a:off x="201881" y="5625539"/>
-            <a:ext cx="3716976" cy="371500"/>
-          </a:xfrm>
-          <a:prstGeom prst="rect">
-            <a:avLst/>
-          </a:prstGeom>
-          <a:noFill/>
-        </p:spPr>
-        <p:txBody>
-          <a:bodyPr wrap="square" rtlCol="0">
-            <a:spAutoFit/>
-          </a:bodyPr>
-          <a:lstStyle/>
-          <a:p>
-            <a:r>
-              <a:rPr lang="en-US" altLang="zh-CN" dirty="0"/>
-              <a:t>figure</a:t>
-            </a:r>
-            <a:r>
-              <a:rPr lang="zh-CN" altLang="en-US" dirty="0"/>
-              <a:t> </a:t>
-            </a:r>
-            <a:r>
-              <a:rPr lang="en-US" altLang="zh-CN" dirty="0"/>
-              <a:t>A:</a:t>
-            </a:r>
-            <a:r>
-              <a:rPr lang="zh-CN" altLang="en-US" dirty="0"/>
-              <a:t> </a:t>
-            </a:r>
-            <a:r>
-              <a:rPr lang="en-US" altLang="zh-CN" dirty="0"/>
-              <a:t>min</a:t>
-            </a:r>
-            <a:r>
-              <a:rPr lang="zh-CN" altLang="en-US" dirty="0"/>
-              <a:t> </a:t>
-            </a:r>
-            <a:r>
-              <a:rPr lang="en-US" altLang="zh-CN" dirty="0"/>
-              <a:t>objective</a:t>
-            </a:r>
-            <a:r>
-              <a:rPr lang="zh-CN" altLang="en-US" dirty="0"/>
-              <a:t> </a:t>
-            </a:r>
-            <a:r>
-              <a:rPr lang="en-US" altLang="zh-CN" dirty="0"/>
-              <a:t>optimization</a:t>
-            </a:r>
-            <a:endParaRPr lang="en-US" dirty="0"/>
-          </a:p>
-        </p:txBody>
-      </p:sp>
-      <p:sp>
-        <p:nvSpPr>
-          <p:cNvPr id="11" name="TextBox 10">
-            <a:extLst>
-              <a:ext uri="{FF2B5EF4-FFF2-40B4-BE49-F238E27FC236}">
-                <a16:creationId xmlns:a16="http://schemas.microsoft.com/office/drawing/2014/main" id="{09DC4EE9-EE1D-C54C-9175-B63E29C9EF6E}"/>
-              </a:ext>
-            </a:extLst>
-          </p:cNvPr>
-          <p:cNvSpPr txBox="1"/>
-          <p:nvPr/>
-        </p:nvSpPr>
-        <p:spPr>
-          <a:xfrm>
-            <a:off x="4582652" y="5625539"/>
-            <a:ext cx="4007369" cy="369332"/>
-          </a:xfrm>
-          <a:prstGeom prst="rect">
-            <a:avLst/>
-          </a:prstGeom>
-          <a:noFill/>
-        </p:spPr>
-        <p:txBody>
-          <a:bodyPr wrap="square" rtlCol="0">
-            <a:spAutoFit/>
-          </a:bodyPr>
-          <a:lstStyle/>
-          <a:p>
-            <a:r>
-              <a:rPr lang="en-US" altLang="zh-CN" dirty="0"/>
-              <a:t>figure</a:t>
-            </a:r>
-            <a:r>
-              <a:rPr lang="zh-CN" altLang="en-US" dirty="0"/>
-              <a:t> </a:t>
-            </a:r>
-            <a:r>
-              <a:rPr lang="en-US" altLang="zh-CN" dirty="0"/>
-              <a:t>B:</a:t>
-            </a:r>
-            <a:r>
-              <a:rPr lang="zh-CN" altLang="en-US" dirty="0"/>
-              <a:t> </a:t>
-            </a:r>
-            <a:r>
-              <a:rPr lang="en-US" altLang="zh-CN" dirty="0"/>
-              <a:t>hyperparameter</a:t>
-            </a:r>
-            <a:r>
-              <a:rPr lang="zh-CN" altLang="en-US" dirty="0"/>
-              <a:t> </a:t>
-            </a:r>
-            <a:r>
-              <a:rPr lang="en-US" altLang="zh-CN" dirty="0"/>
-              <a:t>optimization</a:t>
-            </a:r>
-            <a:endParaRPr lang="en-US" dirty="0"/>
-          </a:p>
-        </p:txBody>
-      </p:sp>
-      <p:sp>
-        <p:nvSpPr>
-          <p:cNvPr id="12" name="TextBox 11">
-            <a:extLst>
-              <a:ext uri="{FF2B5EF4-FFF2-40B4-BE49-F238E27FC236}">
-                <a16:creationId xmlns:a16="http://schemas.microsoft.com/office/drawing/2014/main" id="{71C9AD45-790D-D648-AB62-EFD3DDE851F1}"/>
-              </a:ext>
-            </a:extLst>
-          </p:cNvPr>
-          <p:cNvSpPr txBox="1"/>
-          <p:nvPr/>
-        </p:nvSpPr>
-        <p:spPr>
-          <a:xfrm>
-            <a:off x="8610600" y="4523229"/>
-            <a:ext cx="3716976" cy="371500"/>
-          </a:xfrm>
-          <a:prstGeom prst="rect">
-            <a:avLst/>
-          </a:prstGeom>
-          <a:noFill/>
-        </p:spPr>
-        <p:txBody>
-          <a:bodyPr wrap="square" rtlCol="0">
-            <a:spAutoFit/>
-          </a:bodyPr>
-          <a:lstStyle/>
-          <a:p>
-            <a:r>
-              <a:rPr lang="en-US" altLang="zh-CN" dirty="0"/>
-              <a:t>figure</a:t>
-            </a:r>
-            <a:r>
-              <a:rPr lang="zh-CN" altLang="en-US" dirty="0"/>
-              <a:t> </a:t>
-            </a:r>
-            <a:r>
-              <a:rPr lang="en-US" altLang="zh-CN" dirty="0"/>
-              <a:t>C:</a:t>
-            </a:r>
-            <a:r>
-              <a:rPr lang="zh-CN" altLang="en-US" dirty="0"/>
-              <a:t> </a:t>
-            </a:r>
-            <a:r>
-              <a:rPr lang="en-US" altLang="zh-CN" dirty="0"/>
-              <a:t>best</a:t>
-            </a:r>
-            <a:r>
-              <a:rPr lang="zh-CN" altLang="en-US" dirty="0"/>
-              <a:t> </a:t>
-            </a:r>
-            <a:r>
-              <a:rPr lang="en-US" dirty="0"/>
-              <a:t>hyperparameter</a:t>
-            </a:r>
-          </a:p>
-        </p:txBody>
-      </p:sp>
     </p:spTree>
     <p:extLst>
       <p:ext uri="{BB962C8B-B14F-4D97-AF65-F5344CB8AC3E}">

</xml_diff>

<commit_message>
modify dimentional to dimensional
</commit_message>
<xml_diff>
--- a/final-presentation.pptx
+++ b/final-presentation.pptx
@@ -6121,7 +6121,15 @@
             </a:r>
             <a:r>
               <a:rPr lang="en-US" sz="2000" dirty="0"/>
-              <a:t> important way for impaired person to communicate with the world</a:t>
+              <a:t> important way for impaired </a:t>
+            </a:r>
+            <a:r>
+              <a:rPr lang="en-US" altLang="zh-CN" sz="2000" dirty="0"/>
+              <a:t>people</a:t>
+            </a:r>
+            <a:r>
+              <a:rPr lang="en-US" sz="2000" dirty="0"/>
+              <a:t> to communicate with the world</a:t>
             </a:r>
           </a:p>
           <a:p>
@@ -6402,7 +6410,7 @@
             </a:r>
             <a:r>
               <a:rPr lang="en-US" altLang="zh-CN" sz="2400" b="1" dirty="0"/>
-              <a:t>method</a:t>
+              <a:t>methods</a:t>
             </a:r>
           </a:p>
           <a:p>
@@ -6962,7 +6970,7 @@
             </a:r>
             <a:r>
               <a:rPr lang="en-US" altLang="zh-CN" dirty="0"/>
-              <a:t>tional</a:t>
+              <a:t>sional</a:t>
             </a:r>
             <a:r>
               <a:rPr lang="en-US" dirty="0"/>
@@ -7135,7 +7143,7 @@
             </a:pPr>
             <a:r>
               <a:rPr lang="en-US" altLang="zh-CN" sz="2000" dirty="0"/>
-              <a:t>Our training data are 14-dimentional,</a:t>
+              <a:t>Our training data are 14-dimensional,</a:t>
             </a:r>
             <a:r>
               <a:rPr lang="zh-CN" altLang="en-US" sz="2000" dirty="0"/>
@@ -8126,7 +8134,7 @@
           <a:p>
             <a:r>
               <a:rPr lang="en-US" dirty="0"/>
-              <a:t>14-dimentional original measurement</a:t>
+              <a:t>14-dimensional original measurement</a:t>
             </a:r>
           </a:p>
         </p:txBody>

</xml_diff>